<commit_message>
paper and supp figures
</commit_message>
<xml_diff>
--- a/_PowerPoints/Wednesday Meeting Feb 9.pptx
+++ b/_PowerPoints/Wednesday Meeting Feb 9.pptx
@@ -212,7 +212,7 @@
           <a:p>
             <a:fld id="{85939D8E-AE14-4AF7-9B16-343BF0DF4D9E}" type="datetimeFigureOut">
               <a:rPr lang="en-US" smtClean="0"/>
-              <a:t>2/14/2022</a:t>
+              <a:t>3/21/2022</a:t>
             </a:fld>
             <a:endParaRPr lang="en-US"/>
           </a:p>
@@ -1841,7 +1841,7 @@
           <a:p>
             <a:fld id="{322A28A2-6AEA-4C74-97F2-4CB956558FDC}" type="datetimeFigureOut">
               <a:rPr lang="en-US" smtClean="0"/>
-              <a:t>2/14/2022</a:t>
+              <a:t>3/21/2022</a:t>
             </a:fld>
             <a:endParaRPr lang="en-US"/>
           </a:p>
@@ -2049,7 +2049,7 @@
           <a:p>
             <a:fld id="{322A28A2-6AEA-4C74-97F2-4CB956558FDC}" type="datetimeFigureOut">
               <a:rPr lang="en-US" smtClean="0"/>
-              <a:t>2/14/2022</a:t>
+              <a:t>3/21/2022</a:t>
             </a:fld>
             <a:endParaRPr lang="en-US"/>
           </a:p>
@@ -2305,7 +2305,7 @@
           <a:p>
             <a:fld id="{322A28A2-6AEA-4C74-97F2-4CB956558FDC}" type="datetimeFigureOut">
               <a:rPr lang="en-US" smtClean="0"/>
-              <a:t>2/14/2022</a:t>
+              <a:t>3/21/2022</a:t>
             </a:fld>
             <a:endParaRPr lang="en-US"/>
           </a:p>
@@ -2479,7 +2479,7 @@
           <a:p>
             <a:fld id="{322A28A2-6AEA-4C74-97F2-4CB956558FDC}" type="datetimeFigureOut">
               <a:rPr lang="en-US" smtClean="0"/>
-              <a:t>2/14/2022</a:t>
+              <a:t>3/21/2022</a:t>
             </a:fld>
             <a:endParaRPr lang="en-US"/>
           </a:p>
@@ -2822,7 +2822,7 @@
           <a:p>
             <a:fld id="{322A28A2-6AEA-4C74-97F2-4CB956558FDC}" type="datetimeFigureOut">
               <a:rPr lang="en-US" smtClean="0"/>
-              <a:t>2/14/2022</a:t>
+              <a:t>3/21/2022</a:t>
             </a:fld>
             <a:endParaRPr lang="en-US"/>
           </a:p>
@@ -3097,7 +3097,7 @@
           <a:p>
             <a:fld id="{322A28A2-6AEA-4C74-97F2-4CB956558FDC}" type="datetimeFigureOut">
               <a:rPr lang="en-US" smtClean="0"/>
-              <a:t>2/14/2022</a:t>
+              <a:t>3/21/2022</a:t>
             </a:fld>
             <a:endParaRPr lang="en-US"/>
           </a:p>
@@ -3476,7 +3476,7 @@
           <a:p>
             <a:fld id="{322A28A2-6AEA-4C74-97F2-4CB956558FDC}" type="datetimeFigureOut">
               <a:rPr lang="en-US" smtClean="0"/>
-              <a:t>2/14/2022</a:t>
+              <a:t>3/21/2022</a:t>
             </a:fld>
             <a:endParaRPr lang="en-US"/>
           </a:p>
@@ -3594,7 +3594,7 @@
           <a:p>
             <a:fld id="{322A28A2-6AEA-4C74-97F2-4CB956558FDC}" type="datetimeFigureOut">
               <a:rPr lang="en-US" smtClean="0"/>
-              <a:t>2/14/2022</a:t>
+              <a:t>3/21/2022</a:t>
             </a:fld>
             <a:endParaRPr lang="en-US"/>
           </a:p>
@@ -3765,7 +3765,7 @@
           <a:p>
             <a:fld id="{322A28A2-6AEA-4C74-97F2-4CB956558FDC}" type="datetimeFigureOut">
               <a:rPr lang="en-US" smtClean="0"/>
-              <a:t>2/14/2022</a:t>
+              <a:t>3/21/2022</a:t>
             </a:fld>
             <a:endParaRPr lang="en-US"/>
           </a:p>
@@ -4119,7 +4119,7 @@
           <a:p>
             <a:fld id="{322A28A2-6AEA-4C74-97F2-4CB956558FDC}" type="datetimeFigureOut">
               <a:rPr lang="en-US" smtClean="0"/>
-              <a:t>2/14/2022</a:t>
+              <a:t>3/21/2022</a:t>
             </a:fld>
             <a:endParaRPr lang="en-US"/>
           </a:p>
@@ -4501,7 +4501,7 @@
           <a:p>
             <a:fld id="{322A28A2-6AEA-4C74-97F2-4CB956558FDC}" type="datetimeFigureOut">
               <a:rPr lang="en-US" smtClean="0"/>
-              <a:t>2/14/2022</a:t>
+              <a:t>3/21/2022</a:t>
             </a:fld>
             <a:endParaRPr lang="en-US"/>
           </a:p>
@@ -4788,7 +4788,7 @@
           <a:p>
             <a:fld id="{322A28A2-6AEA-4C74-97F2-4CB956558FDC}" type="datetimeFigureOut">
               <a:rPr lang="en-US" smtClean="0"/>
-              <a:t>2/14/2022</a:t>
+              <a:t>3/21/2022</a:t>
             </a:fld>
             <a:endParaRPr lang="en-US"/>
           </a:p>

</xml_diff>